<commit_message>
- Updated SDK files to build 131731
</commit_message>
<xml_diff>
--- a/Powerpoint/interfaces.pptx
+++ b/Powerpoint/interfaces.pptx
@@ -8,6 +8,7 @@
   </p:sldMasterIdLst>
   <p:sldIdLst>
     <p:sldId id="259" r:id="rId4"/>
+    <p:sldId id="261" r:id="rId5"/>
   </p:sldIdLst>
   <p:sldSz cx="9144000" cy="5143500" type="screen16x9"/>
   <p:notesSz cx="6858000" cy="9144000"/>
@@ -9195,6 +9196,2143 @@
 </p:sld>
 </file>
 
+<file path=ppt/slides/slide2.xml><?xml version="1.0" encoding="utf-8"?>
+<p:sld xmlns:a="http://schemas.openxmlformats.org/drawingml/2006/main" xmlns:r="http://schemas.openxmlformats.org/officeDocument/2006/relationships" xmlns:p="http://schemas.openxmlformats.org/presentationml/2006/main">
+  <p:cSld>
+    <p:spTree>
+      <p:nvGrpSpPr>
+        <p:cNvPr id="1" name=""/>
+        <p:cNvGrpSpPr/>
+        <p:nvPr/>
+      </p:nvGrpSpPr>
+      <p:grpSpPr>
+        <a:xfrm>
+          <a:off x="0" y="0"/>
+          <a:ext cx="0" cy="0"/>
+          <a:chOff x="0" y="0"/>
+          <a:chExt cx="0" cy="0"/>
+        </a:xfrm>
+      </p:grpSpPr>
+      <p:grpSp>
+        <p:nvGrpSpPr>
+          <p:cNvPr id="60" name="Gruppieren 59">
+            <a:extLst>
+              <a:ext uri="{FF2B5EF4-FFF2-40B4-BE49-F238E27FC236}">
+                <a16:creationId xmlns:a16="http://schemas.microsoft.com/office/drawing/2014/main" id="{77B8A627-5835-4BFD-9DD0-05C08A094ADE}"/>
+              </a:ext>
+            </a:extLst>
+          </p:cNvPr>
+          <p:cNvGrpSpPr/>
+          <p:nvPr/>
+        </p:nvGrpSpPr>
+        <p:grpSpPr>
+          <a:xfrm>
+            <a:off x="305415" y="644892"/>
+            <a:ext cx="7893595" cy="3871074"/>
+            <a:chOff x="305415" y="644892"/>
+            <a:chExt cx="7893595" cy="3871074"/>
+          </a:xfrm>
+        </p:grpSpPr>
+        <p:sp>
+          <p:nvSpPr>
+            <p:cNvPr id="3" name="Rechteck 2">
+              <a:extLst>
+                <a:ext uri="{FF2B5EF4-FFF2-40B4-BE49-F238E27FC236}">
+                  <a16:creationId xmlns:a16="http://schemas.microsoft.com/office/drawing/2014/main" id="{52400EA0-55FE-45C9-B7F3-DD2A42AAB023}"/>
+                </a:ext>
+              </a:extLst>
+            </p:cNvPr>
+            <p:cNvSpPr/>
+            <p:nvPr/>
+          </p:nvSpPr>
+          <p:spPr>
+            <a:xfrm>
+              <a:off x="1907704" y="788908"/>
+              <a:ext cx="5976664" cy="576064"/>
+            </a:xfrm>
+            <a:prstGeom prst="rect">
+              <a:avLst/>
+            </a:prstGeom>
+            <a:solidFill>
+              <a:srgbClr val="43919B"/>
+            </a:solidFill>
+          </p:spPr>
+          <p:style>
+            <a:lnRef idx="2">
+              <a:schemeClr val="accent1">
+                <a:shade val="50000"/>
+              </a:schemeClr>
+            </a:lnRef>
+            <a:fillRef idx="1">
+              <a:schemeClr val="accent1"/>
+            </a:fillRef>
+            <a:effectRef idx="0">
+              <a:schemeClr val="accent1"/>
+            </a:effectRef>
+            <a:fontRef idx="minor">
+              <a:schemeClr val="lt1"/>
+            </a:fontRef>
+          </p:style>
+          <p:txBody>
+            <a:bodyPr rtlCol="0" anchor="ctr"/>
+            <a:lstStyle/>
+            <a:p>
+              <a:pPr algn="ctr"/>
+              <a:endParaRPr lang="de-DE" dirty="0"/>
+            </a:p>
+          </p:txBody>
+        </p:sp>
+        <p:sp>
+          <p:nvSpPr>
+            <p:cNvPr id="4" name="Rechteck 3">
+              <a:extLst>
+                <a:ext uri="{FF2B5EF4-FFF2-40B4-BE49-F238E27FC236}">
+                  <a16:creationId xmlns:a16="http://schemas.microsoft.com/office/drawing/2014/main" id="{2EC63FE6-A8DD-430B-B3C7-C5F5E19F2AE3}"/>
+                </a:ext>
+              </a:extLst>
+            </p:cNvPr>
+            <p:cNvSpPr/>
+            <p:nvPr/>
+          </p:nvSpPr>
+          <p:spPr>
+            <a:xfrm>
+              <a:off x="2051720" y="1005326"/>
+              <a:ext cx="1286222" cy="248211"/>
+            </a:xfrm>
+            <a:prstGeom prst="rect">
+              <a:avLst/>
+            </a:prstGeom>
+            <a:solidFill>
+              <a:schemeClr val="accent3">
+                <a:lumMod val="40000"/>
+                <a:lumOff val="60000"/>
+              </a:schemeClr>
+            </a:solidFill>
+            <a:ln>
+              <a:noFill/>
+            </a:ln>
+          </p:spPr>
+          <p:style>
+            <a:lnRef idx="2">
+              <a:schemeClr val="accent1">
+                <a:shade val="50000"/>
+              </a:schemeClr>
+            </a:lnRef>
+            <a:fillRef idx="1">
+              <a:schemeClr val="accent1"/>
+            </a:fillRef>
+            <a:effectRef idx="0">
+              <a:schemeClr val="accent1"/>
+            </a:effectRef>
+            <a:fontRef idx="minor">
+              <a:schemeClr val="lt1"/>
+            </a:fontRef>
+          </p:style>
+          <p:txBody>
+            <a:bodyPr rtlCol="0" anchor="ctr"/>
+            <a:lstStyle/>
+            <a:p>
+              <a:pPr algn="ctr"/>
+              <a:r>
+                <a:rPr lang="de-DE" sz="1200" dirty="0">
+                  <a:solidFill>
+                    <a:srgbClr val="196867"/>
+                  </a:solidFill>
+                </a:rPr>
+                <a:t>App Instance</a:t>
+              </a:r>
+              <a:endParaRPr lang="de-DE" sz="500" dirty="0">
+                <a:solidFill>
+                  <a:srgbClr val="196867"/>
+                </a:solidFill>
+              </a:endParaRPr>
+            </a:p>
+          </p:txBody>
+        </p:sp>
+        <p:sp>
+          <p:nvSpPr>
+            <p:cNvPr id="5" name="Rechteck 4">
+              <a:extLst>
+                <a:ext uri="{FF2B5EF4-FFF2-40B4-BE49-F238E27FC236}">
+                  <a16:creationId xmlns:a16="http://schemas.microsoft.com/office/drawing/2014/main" id="{8534F571-6D85-4799-9013-8C07117171D1}"/>
+                </a:ext>
+              </a:extLst>
+            </p:cNvPr>
+            <p:cNvSpPr/>
+            <p:nvPr/>
+          </p:nvSpPr>
+          <p:spPr>
+            <a:xfrm>
+              <a:off x="3517536" y="1005326"/>
+              <a:ext cx="1286222" cy="248211"/>
+            </a:xfrm>
+            <a:prstGeom prst="rect">
+              <a:avLst/>
+            </a:prstGeom>
+            <a:solidFill>
+              <a:schemeClr val="accent3">
+                <a:lumMod val="40000"/>
+                <a:lumOff val="60000"/>
+              </a:schemeClr>
+            </a:solidFill>
+            <a:ln>
+              <a:noFill/>
+            </a:ln>
+          </p:spPr>
+          <p:style>
+            <a:lnRef idx="2">
+              <a:schemeClr val="accent1">
+                <a:shade val="50000"/>
+              </a:schemeClr>
+            </a:lnRef>
+            <a:fillRef idx="1">
+              <a:schemeClr val="accent1"/>
+            </a:fillRef>
+            <a:effectRef idx="0">
+              <a:schemeClr val="accent1"/>
+            </a:effectRef>
+            <a:fontRef idx="minor">
+              <a:schemeClr val="lt1"/>
+            </a:fontRef>
+          </p:style>
+          <p:txBody>
+            <a:bodyPr rtlCol="0" anchor="ctr"/>
+            <a:lstStyle/>
+            <a:p>
+              <a:pPr algn="ctr"/>
+              <a:r>
+                <a:rPr lang="de-DE" sz="1200" dirty="0">
+                  <a:solidFill>
+                    <a:srgbClr val="196867"/>
+                  </a:solidFill>
+                </a:rPr>
+                <a:t>App Instance</a:t>
+              </a:r>
+              <a:endParaRPr lang="de-DE" sz="500" dirty="0">
+                <a:solidFill>
+                  <a:srgbClr val="196867"/>
+                </a:solidFill>
+              </a:endParaRPr>
+            </a:p>
+          </p:txBody>
+        </p:sp>
+        <p:sp>
+          <p:nvSpPr>
+            <p:cNvPr id="6" name="Rechteck 5">
+              <a:extLst>
+                <a:ext uri="{FF2B5EF4-FFF2-40B4-BE49-F238E27FC236}">
+                  <a16:creationId xmlns:a16="http://schemas.microsoft.com/office/drawing/2014/main" id="{F60F13F9-7AE9-42B3-B3AC-DA7FDCC3492B}"/>
+                </a:ext>
+              </a:extLst>
+            </p:cNvPr>
+            <p:cNvSpPr/>
+            <p:nvPr/>
+          </p:nvSpPr>
+          <p:spPr>
+            <a:xfrm>
+              <a:off x="4983352" y="1005326"/>
+              <a:ext cx="1286222" cy="248211"/>
+            </a:xfrm>
+            <a:prstGeom prst="rect">
+              <a:avLst/>
+            </a:prstGeom>
+            <a:solidFill>
+              <a:schemeClr val="accent3">
+                <a:lumMod val="40000"/>
+                <a:lumOff val="60000"/>
+              </a:schemeClr>
+            </a:solidFill>
+            <a:ln>
+              <a:noFill/>
+            </a:ln>
+          </p:spPr>
+          <p:style>
+            <a:lnRef idx="2">
+              <a:schemeClr val="accent1">
+                <a:shade val="50000"/>
+              </a:schemeClr>
+            </a:lnRef>
+            <a:fillRef idx="1">
+              <a:schemeClr val="accent1"/>
+            </a:fillRef>
+            <a:effectRef idx="0">
+              <a:schemeClr val="accent1"/>
+            </a:effectRef>
+            <a:fontRef idx="minor">
+              <a:schemeClr val="lt1"/>
+            </a:fontRef>
+          </p:style>
+          <p:txBody>
+            <a:bodyPr rtlCol="0" anchor="ctr"/>
+            <a:lstStyle/>
+            <a:p>
+              <a:pPr algn="ctr"/>
+              <a:r>
+                <a:rPr lang="de-DE" sz="1200" dirty="0">
+                  <a:solidFill>
+                    <a:srgbClr val="196867"/>
+                  </a:solidFill>
+                </a:rPr>
+                <a:t>App Instance</a:t>
+              </a:r>
+              <a:endParaRPr lang="de-DE" sz="500" dirty="0">
+                <a:solidFill>
+                  <a:srgbClr val="196867"/>
+                </a:solidFill>
+              </a:endParaRPr>
+            </a:p>
+          </p:txBody>
+        </p:sp>
+        <p:sp>
+          <p:nvSpPr>
+            <p:cNvPr id="7" name="Rechteck 6">
+              <a:extLst>
+                <a:ext uri="{FF2B5EF4-FFF2-40B4-BE49-F238E27FC236}">
+                  <a16:creationId xmlns:a16="http://schemas.microsoft.com/office/drawing/2014/main" id="{F3DB62BA-E341-42A4-9122-445F072B3F90}"/>
+                </a:ext>
+              </a:extLst>
+            </p:cNvPr>
+            <p:cNvSpPr/>
+            <p:nvPr/>
+          </p:nvSpPr>
+          <p:spPr>
+            <a:xfrm>
+              <a:off x="6449169" y="1005326"/>
+              <a:ext cx="1286222" cy="248211"/>
+            </a:xfrm>
+            <a:prstGeom prst="rect">
+              <a:avLst/>
+            </a:prstGeom>
+            <a:solidFill>
+              <a:schemeClr val="accent3">
+                <a:lumMod val="40000"/>
+                <a:lumOff val="60000"/>
+              </a:schemeClr>
+            </a:solidFill>
+            <a:ln>
+              <a:noFill/>
+            </a:ln>
+          </p:spPr>
+          <p:style>
+            <a:lnRef idx="2">
+              <a:schemeClr val="accent1">
+                <a:shade val="50000"/>
+              </a:schemeClr>
+            </a:lnRef>
+            <a:fillRef idx="1">
+              <a:schemeClr val="accent1"/>
+            </a:fillRef>
+            <a:effectRef idx="0">
+              <a:schemeClr val="accent1"/>
+            </a:effectRef>
+            <a:fontRef idx="minor">
+              <a:schemeClr val="lt1"/>
+            </a:fontRef>
+          </p:style>
+          <p:txBody>
+            <a:bodyPr rtlCol="0" anchor="ctr"/>
+            <a:lstStyle/>
+            <a:p>
+              <a:pPr algn="ctr"/>
+              <a:r>
+                <a:rPr lang="de-DE" sz="1200" dirty="0">
+                  <a:solidFill>
+                    <a:srgbClr val="196867"/>
+                  </a:solidFill>
+                </a:rPr>
+                <a:t>App Instance</a:t>
+              </a:r>
+              <a:endParaRPr lang="de-DE" sz="500" dirty="0">
+                <a:solidFill>
+                  <a:srgbClr val="196867"/>
+                </a:solidFill>
+              </a:endParaRPr>
+            </a:p>
+          </p:txBody>
+        </p:sp>
+        <p:sp>
+          <p:nvSpPr>
+            <p:cNvPr id="8" name="Textfeld 7">
+              <a:extLst>
+                <a:ext uri="{FF2B5EF4-FFF2-40B4-BE49-F238E27FC236}">
+                  <a16:creationId xmlns:a16="http://schemas.microsoft.com/office/drawing/2014/main" id="{4B088B5F-29E2-479F-91C6-29C4DC7FF256}"/>
+                </a:ext>
+              </a:extLst>
+            </p:cNvPr>
+            <p:cNvSpPr txBox="1"/>
+            <p:nvPr/>
+          </p:nvSpPr>
+          <p:spPr>
+            <a:xfrm>
+              <a:off x="1958393" y="749939"/>
+              <a:ext cx="979564" cy="276999"/>
+            </a:xfrm>
+            <a:prstGeom prst="rect">
+              <a:avLst/>
+            </a:prstGeom>
+            <a:noFill/>
+          </p:spPr>
+          <p:txBody>
+            <a:bodyPr wrap="none" rtlCol="0">
+              <a:spAutoFit/>
+            </a:bodyPr>
+            <a:lstStyle/>
+            <a:p>
+              <a:r>
+                <a:rPr lang="de-DE" sz="1200" dirty="0">
+                  <a:solidFill>
+                    <a:schemeClr val="bg1"/>
+                  </a:solidFill>
+                </a:rPr>
+                <a:t>App Services</a:t>
+              </a:r>
+            </a:p>
+          </p:txBody>
+        </p:sp>
+        <p:sp>
+          <p:nvSpPr>
+            <p:cNvPr id="10" name="Rechteck 9">
+              <a:extLst>
+                <a:ext uri="{FF2B5EF4-FFF2-40B4-BE49-F238E27FC236}">
+                  <a16:creationId xmlns:a16="http://schemas.microsoft.com/office/drawing/2014/main" id="{F7534C6A-8069-4C26-AEA7-75B795931B3D}"/>
+                </a:ext>
+              </a:extLst>
+            </p:cNvPr>
+            <p:cNvSpPr/>
+            <p:nvPr/>
+          </p:nvSpPr>
+          <p:spPr>
+            <a:xfrm>
+              <a:off x="1907704" y="1767836"/>
+              <a:ext cx="3075648" cy="576064"/>
+            </a:xfrm>
+            <a:prstGeom prst="rect">
+              <a:avLst/>
+            </a:prstGeom>
+            <a:solidFill>
+              <a:srgbClr val="43919B"/>
+            </a:solidFill>
+          </p:spPr>
+          <p:style>
+            <a:lnRef idx="2">
+              <a:schemeClr val="accent1">
+                <a:shade val="50000"/>
+              </a:schemeClr>
+            </a:lnRef>
+            <a:fillRef idx="1">
+              <a:schemeClr val="accent1"/>
+            </a:fillRef>
+            <a:effectRef idx="0">
+              <a:schemeClr val="accent1"/>
+            </a:effectRef>
+            <a:fontRef idx="minor">
+              <a:schemeClr val="lt1"/>
+            </a:fontRef>
+          </p:style>
+          <p:txBody>
+            <a:bodyPr rtlCol="0" anchor="ctr"/>
+            <a:lstStyle/>
+            <a:p>
+              <a:pPr algn="ctr"/>
+              <a:endParaRPr lang="de-DE" dirty="0"/>
+            </a:p>
+          </p:txBody>
+        </p:sp>
+        <p:sp>
+          <p:nvSpPr>
+            <p:cNvPr id="11" name="Rechteck 10">
+              <a:extLst>
+                <a:ext uri="{FF2B5EF4-FFF2-40B4-BE49-F238E27FC236}">
+                  <a16:creationId xmlns:a16="http://schemas.microsoft.com/office/drawing/2014/main" id="{45975DE2-51D6-44C6-8475-33C0A09A1D67}"/>
+                </a:ext>
+              </a:extLst>
+            </p:cNvPr>
+            <p:cNvSpPr/>
+            <p:nvPr/>
+          </p:nvSpPr>
+          <p:spPr>
+            <a:xfrm>
+              <a:off x="2051720" y="1995686"/>
+              <a:ext cx="1286222" cy="248211"/>
+            </a:xfrm>
+            <a:prstGeom prst="rect">
+              <a:avLst/>
+            </a:prstGeom>
+            <a:solidFill>
+              <a:schemeClr val="accent3">
+                <a:lumMod val="40000"/>
+                <a:lumOff val="60000"/>
+              </a:schemeClr>
+            </a:solidFill>
+            <a:ln>
+              <a:noFill/>
+            </a:ln>
+          </p:spPr>
+          <p:style>
+            <a:lnRef idx="2">
+              <a:schemeClr val="accent1">
+                <a:shade val="50000"/>
+              </a:schemeClr>
+            </a:lnRef>
+            <a:fillRef idx="1">
+              <a:schemeClr val="accent1"/>
+            </a:fillRef>
+            <a:effectRef idx="0">
+              <a:schemeClr val="accent1"/>
+            </a:effectRef>
+            <a:fontRef idx="minor">
+              <a:schemeClr val="lt1"/>
+            </a:fontRef>
+          </p:style>
+          <p:txBody>
+            <a:bodyPr rtlCol="0" anchor="ctr"/>
+            <a:lstStyle/>
+            <a:p>
+              <a:pPr algn="ctr"/>
+              <a:r>
+                <a:rPr lang="de-DE" sz="1200" dirty="0">
+                  <a:solidFill>
+                    <a:srgbClr val="196867"/>
+                  </a:solidFill>
+                </a:rPr>
+                <a:t>App Websocket</a:t>
+              </a:r>
+              <a:endParaRPr lang="de-DE" sz="500" dirty="0">
+                <a:solidFill>
+                  <a:srgbClr val="196867"/>
+                </a:solidFill>
+              </a:endParaRPr>
+            </a:p>
+          </p:txBody>
+        </p:sp>
+        <p:sp>
+          <p:nvSpPr>
+            <p:cNvPr id="12" name="Rechteck 11">
+              <a:extLst>
+                <a:ext uri="{FF2B5EF4-FFF2-40B4-BE49-F238E27FC236}">
+                  <a16:creationId xmlns:a16="http://schemas.microsoft.com/office/drawing/2014/main" id="{43FDD7B2-2FDA-4438-80F8-862CEC5AF47E}"/>
+                </a:ext>
+              </a:extLst>
+            </p:cNvPr>
+            <p:cNvSpPr/>
+            <p:nvPr/>
+          </p:nvSpPr>
+          <p:spPr>
+            <a:xfrm>
+              <a:off x="3512942" y="1995686"/>
+              <a:ext cx="1286222" cy="248211"/>
+            </a:xfrm>
+            <a:prstGeom prst="rect">
+              <a:avLst/>
+            </a:prstGeom>
+            <a:solidFill>
+              <a:schemeClr val="accent3">
+                <a:lumMod val="40000"/>
+                <a:lumOff val="60000"/>
+              </a:schemeClr>
+            </a:solidFill>
+            <a:ln>
+              <a:noFill/>
+            </a:ln>
+          </p:spPr>
+          <p:style>
+            <a:lnRef idx="2">
+              <a:schemeClr val="accent1">
+                <a:shade val="50000"/>
+              </a:schemeClr>
+            </a:lnRef>
+            <a:fillRef idx="1">
+              <a:schemeClr val="accent1"/>
+            </a:fillRef>
+            <a:effectRef idx="0">
+              <a:schemeClr val="accent1"/>
+            </a:effectRef>
+            <a:fontRef idx="minor">
+              <a:schemeClr val="lt1"/>
+            </a:fontRef>
+          </p:style>
+          <p:txBody>
+            <a:bodyPr rtlCol="0" anchor="ctr"/>
+            <a:lstStyle/>
+            <a:p>
+              <a:pPr algn="ctr"/>
+              <a:r>
+                <a:rPr lang="de-DE" sz="1200" dirty="0">
+                  <a:solidFill>
+                    <a:srgbClr val="196867"/>
+                  </a:solidFill>
+                </a:rPr>
+                <a:t>Db-Files</a:t>
+              </a:r>
+              <a:endParaRPr lang="de-DE" sz="500" dirty="0">
+                <a:solidFill>
+                  <a:srgbClr val="196867"/>
+                </a:solidFill>
+              </a:endParaRPr>
+            </a:p>
+          </p:txBody>
+        </p:sp>
+        <p:sp>
+          <p:nvSpPr>
+            <p:cNvPr id="13" name="Textfeld 12">
+              <a:extLst>
+                <a:ext uri="{FF2B5EF4-FFF2-40B4-BE49-F238E27FC236}">
+                  <a16:creationId xmlns:a16="http://schemas.microsoft.com/office/drawing/2014/main" id="{56570EE7-2126-4442-A398-B2E7ACA9A5BC}"/>
+                </a:ext>
+              </a:extLst>
+            </p:cNvPr>
+            <p:cNvSpPr txBox="1"/>
+            <p:nvPr/>
+          </p:nvSpPr>
+          <p:spPr>
+            <a:xfrm>
+              <a:off x="1958393" y="1735932"/>
+              <a:ext cx="1574726" cy="276999"/>
+            </a:xfrm>
+            <a:prstGeom prst="rect">
+              <a:avLst/>
+            </a:prstGeom>
+            <a:noFill/>
+          </p:spPr>
+          <p:txBody>
+            <a:bodyPr wrap="none" rtlCol="0">
+              <a:spAutoFit/>
+            </a:bodyPr>
+            <a:lstStyle/>
+            <a:p>
+              <a:r>
+                <a:rPr lang="de-DE" sz="1200" dirty="0">
+                  <a:solidFill>
+                    <a:schemeClr val="bg1"/>
+                  </a:solidFill>
+                </a:rPr>
+                <a:t>App Platform Libraries</a:t>
+              </a:r>
+            </a:p>
+          </p:txBody>
+        </p:sp>
+        <p:sp>
+          <p:nvSpPr>
+            <p:cNvPr id="14" name="Rechteck 13">
+              <a:extLst>
+                <a:ext uri="{FF2B5EF4-FFF2-40B4-BE49-F238E27FC236}">
+                  <a16:creationId xmlns:a16="http://schemas.microsoft.com/office/drawing/2014/main" id="{EED9C309-3E85-4EDC-B4C0-B374647AEDC0}"/>
+                </a:ext>
+              </a:extLst>
+            </p:cNvPr>
+            <p:cNvSpPr/>
+            <p:nvPr/>
+          </p:nvSpPr>
+          <p:spPr>
+            <a:xfrm>
+              <a:off x="6012160" y="1767836"/>
+              <a:ext cx="1872208" cy="576064"/>
+            </a:xfrm>
+            <a:prstGeom prst="rect">
+              <a:avLst/>
+            </a:prstGeom>
+            <a:solidFill>
+              <a:srgbClr val="43919B"/>
+            </a:solidFill>
+          </p:spPr>
+          <p:style>
+            <a:lnRef idx="2">
+              <a:schemeClr val="accent1">
+                <a:shade val="50000"/>
+              </a:schemeClr>
+            </a:lnRef>
+            <a:fillRef idx="1">
+              <a:schemeClr val="accent1"/>
+            </a:fillRef>
+            <a:effectRef idx="0">
+              <a:schemeClr val="accent1"/>
+            </a:effectRef>
+            <a:fontRef idx="minor">
+              <a:schemeClr val="lt1"/>
+            </a:fontRef>
+          </p:style>
+          <p:txBody>
+            <a:bodyPr rtlCol="0" anchor="ctr"/>
+            <a:lstStyle/>
+            <a:p>
+              <a:pPr algn="ctr"/>
+              <a:endParaRPr lang="de-DE" dirty="0"/>
+            </a:p>
+          </p:txBody>
+        </p:sp>
+        <p:sp>
+          <p:nvSpPr>
+            <p:cNvPr id="15" name="Rechteck 14">
+              <a:extLst>
+                <a:ext uri="{FF2B5EF4-FFF2-40B4-BE49-F238E27FC236}">
+                  <a16:creationId xmlns:a16="http://schemas.microsoft.com/office/drawing/2014/main" id="{6F05DE79-80A0-4F85-8CA1-15598F03ABA9}"/>
+                </a:ext>
+              </a:extLst>
+            </p:cNvPr>
+            <p:cNvSpPr/>
+            <p:nvPr/>
+          </p:nvSpPr>
+          <p:spPr>
+            <a:xfrm>
+              <a:off x="6156176" y="1995686"/>
+              <a:ext cx="648072" cy="248211"/>
+            </a:xfrm>
+            <a:prstGeom prst="rect">
+              <a:avLst/>
+            </a:prstGeom>
+            <a:solidFill>
+              <a:schemeClr val="accent3">
+                <a:lumMod val="40000"/>
+                <a:lumOff val="60000"/>
+              </a:schemeClr>
+            </a:solidFill>
+            <a:ln>
+              <a:noFill/>
+            </a:ln>
+          </p:spPr>
+          <p:style>
+            <a:lnRef idx="2">
+              <a:schemeClr val="accent1">
+                <a:shade val="50000"/>
+              </a:schemeClr>
+            </a:lnRef>
+            <a:fillRef idx="1">
+              <a:schemeClr val="accent1"/>
+            </a:fillRef>
+            <a:effectRef idx="0">
+              <a:schemeClr val="accent1"/>
+            </a:effectRef>
+            <a:fontRef idx="minor">
+              <a:schemeClr val="lt1"/>
+            </a:fontRef>
+          </p:style>
+          <p:txBody>
+            <a:bodyPr rtlCol="0" anchor="ctr"/>
+            <a:lstStyle/>
+            <a:p>
+              <a:pPr algn="ctr"/>
+              <a:r>
+                <a:rPr lang="de-DE" sz="1200" dirty="0">
+                  <a:solidFill>
+                    <a:srgbClr val="196867"/>
+                  </a:solidFill>
+                </a:rPr>
+                <a:t>JSON</a:t>
+              </a:r>
+              <a:endParaRPr lang="de-DE" sz="500" dirty="0">
+                <a:solidFill>
+                  <a:srgbClr val="196867"/>
+                </a:solidFill>
+              </a:endParaRPr>
+            </a:p>
+          </p:txBody>
+        </p:sp>
+        <p:sp>
+          <p:nvSpPr>
+            <p:cNvPr id="16" name="Rechteck 15">
+              <a:extLst>
+                <a:ext uri="{FF2B5EF4-FFF2-40B4-BE49-F238E27FC236}">
+                  <a16:creationId xmlns:a16="http://schemas.microsoft.com/office/drawing/2014/main" id="{50DBFC61-5C69-4F22-9A48-D975517E228B}"/>
+                </a:ext>
+              </a:extLst>
+            </p:cNvPr>
+            <p:cNvSpPr/>
+            <p:nvPr/>
+          </p:nvSpPr>
+          <p:spPr>
+            <a:xfrm>
+              <a:off x="7092280" y="1995686"/>
+              <a:ext cx="696828" cy="248211"/>
+            </a:xfrm>
+            <a:prstGeom prst="rect">
+              <a:avLst/>
+            </a:prstGeom>
+            <a:solidFill>
+              <a:schemeClr val="accent3">
+                <a:lumMod val="40000"/>
+                <a:lumOff val="60000"/>
+              </a:schemeClr>
+            </a:solidFill>
+            <a:ln>
+              <a:noFill/>
+            </a:ln>
+          </p:spPr>
+          <p:style>
+            <a:lnRef idx="2">
+              <a:schemeClr val="accent1">
+                <a:shade val="50000"/>
+              </a:schemeClr>
+            </a:lnRef>
+            <a:fillRef idx="1">
+              <a:schemeClr val="accent1"/>
+            </a:fillRef>
+            <a:effectRef idx="0">
+              <a:schemeClr val="accent1"/>
+            </a:effectRef>
+            <a:fontRef idx="minor">
+              <a:schemeClr val="lt1"/>
+            </a:fontRef>
+          </p:style>
+          <p:txBody>
+            <a:bodyPr rtlCol="0" anchor="ctr"/>
+            <a:lstStyle/>
+            <a:p>
+              <a:pPr algn="ctr"/>
+              <a:r>
+                <a:rPr lang="de-DE" sz="1200" dirty="0">
+                  <a:solidFill>
+                    <a:srgbClr val="196867"/>
+                  </a:solidFill>
+                </a:rPr>
+                <a:t>XML</a:t>
+              </a:r>
+              <a:endParaRPr lang="de-DE" sz="500" dirty="0">
+                <a:solidFill>
+                  <a:srgbClr val="196867"/>
+                </a:solidFill>
+              </a:endParaRPr>
+            </a:p>
+          </p:txBody>
+        </p:sp>
+        <p:sp>
+          <p:nvSpPr>
+            <p:cNvPr id="17" name="Textfeld 16">
+              <a:extLst>
+                <a:ext uri="{FF2B5EF4-FFF2-40B4-BE49-F238E27FC236}">
+                  <a16:creationId xmlns:a16="http://schemas.microsoft.com/office/drawing/2014/main" id="{954070DC-D711-4640-964E-BF17020B2E81}"/>
+                </a:ext>
+              </a:extLst>
+            </p:cNvPr>
+            <p:cNvSpPr txBox="1"/>
+            <p:nvPr/>
+          </p:nvSpPr>
+          <p:spPr>
+            <a:xfrm>
+              <a:off x="6012160" y="1735932"/>
+              <a:ext cx="1450846" cy="276999"/>
+            </a:xfrm>
+            <a:prstGeom prst="rect">
+              <a:avLst/>
+            </a:prstGeom>
+            <a:noFill/>
+          </p:spPr>
+          <p:txBody>
+            <a:bodyPr wrap="none" rtlCol="0">
+              <a:spAutoFit/>
+            </a:bodyPr>
+            <a:lstStyle/>
+            <a:p>
+              <a:r>
+                <a:rPr lang="de-DE" sz="1200" dirty="0">
+                  <a:solidFill>
+                    <a:schemeClr val="bg1"/>
+                  </a:solidFill>
+                </a:rPr>
+                <a:t>Standalone Libraries</a:t>
+              </a:r>
+            </a:p>
+          </p:txBody>
+        </p:sp>
+        <p:sp>
+          <p:nvSpPr>
+            <p:cNvPr id="18" name="Rechteck 17">
+              <a:extLst>
+                <a:ext uri="{FF2B5EF4-FFF2-40B4-BE49-F238E27FC236}">
+                  <a16:creationId xmlns:a16="http://schemas.microsoft.com/office/drawing/2014/main" id="{852A60AC-4C46-4982-B4A6-0035FE8E9FB9}"/>
+                </a:ext>
+              </a:extLst>
+            </p:cNvPr>
+            <p:cNvSpPr/>
+            <p:nvPr/>
+          </p:nvSpPr>
+          <p:spPr>
+            <a:xfrm>
+              <a:off x="1907704" y="2793880"/>
+              <a:ext cx="5976664" cy="425942"/>
+            </a:xfrm>
+            <a:prstGeom prst="rect">
+              <a:avLst/>
+            </a:prstGeom>
+            <a:solidFill>
+              <a:srgbClr val="43919B"/>
+            </a:solidFill>
+          </p:spPr>
+          <p:style>
+            <a:lnRef idx="2">
+              <a:schemeClr val="accent1">
+                <a:shade val="50000"/>
+              </a:schemeClr>
+            </a:lnRef>
+            <a:fillRef idx="1">
+              <a:schemeClr val="accent1"/>
+            </a:fillRef>
+            <a:effectRef idx="0">
+              <a:schemeClr val="accent1"/>
+            </a:effectRef>
+            <a:fontRef idx="minor">
+              <a:schemeClr val="lt1"/>
+            </a:fontRef>
+          </p:style>
+          <p:txBody>
+            <a:bodyPr rtlCol="0" anchor="ctr"/>
+            <a:lstStyle/>
+            <a:p>
+              <a:pPr algn="ctr"/>
+              <a:endParaRPr lang="de-DE" dirty="0"/>
+            </a:p>
+          </p:txBody>
+        </p:sp>
+        <p:sp>
+          <p:nvSpPr>
+            <p:cNvPr id="19" name="Textfeld 18">
+              <a:extLst>
+                <a:ext uri="{FF2B5EF4-FFF2-40B4-BE49-F238E27FC236}">
+                  <a16:creationId xmlns:a16="http://schemas.microsoft.com/office/drawing/2014/main" id="{EBD99B62-9445-4210-BE17-84E027EE1489}"/>
+                </a:ext>
+              </a:extLst>
+            </p:cNvPr>
+            <p:cNvSpPr txBox="1"/>
+            <p:nvPr/>
+          </p:nvSpPr>
+          <p:spPr>
+            <a:xfrm>
+              <a:off x="1958393" y="2868351"/>
+              <a:ext cx="1663148" cy="276999"/>
+            </a:xfrm>
+            <a:prstGeom prst="rect">
+              <a:avLst/>
+            </a:prstGeom>
+            <a:noFill/>
+          </p:spPr>
+          <p:txBody>
+            <a:bodyPr wrap="none" rtlCol="0">
+              <a:spAutoFit/>
+            </a:bodyPr>
+            <a:lstStyle/>
+            <a:p>
+              <a:r>
+                <a:rPr lang="de-DE" sz="1200" dirty="0">
+                  <a:solidFill>
+                    <a:schemeClr val="bg1"/>
+                  </a:solidFill>
+                </a:rPr>
+                <a:t>App Platform Interfaces</a:t>
+              </a:r>
+            </a:p>
+          </p:txBody>
+        </p:sp>
+        <p:sp>
+          <p:nvSpPr>
+            <p:cNvPr id="20" name="Rechteck 19">
+              <a:extLst>
+                <a:ext uri="{FF2B5EF4-FFF2-40B4-BE49-F238E27FC236}">
+                  <a16:creationId xmlns:a16="http://schemas.microsoft.com/office/drawing/2014/main" id="{EE8EFA2D-FA52-40A7-9563-B4027AFC68B1}"/>
+                </a:ext>
+              </a:extLst>
+            </p:cNvPr>
+            <p:cNvSpPr/>
+            <p:nvPr/>
+          </p:nvSpPr>
+          <p:spPr>
+            <a:xfrm>
+              <a:off x="1907704" y="3669801"/>
+              <a:ext cx="5976664" cy="723759"/>
+            </a:xfrm>
+            <a:prstGeom prst="rect">
+              <a:avLst/>
+            </a:prstGeom>
+            <a:solidFill>
+              <a:srgbClr val="B2D9DE"/>
+            </a:solidFill>
+          </p:spPr>
+          <p:style>
+            <a:lnRef idx="2">
+              <a:schemeClr val="accent1">
+                <a:shade val="50000"/>
+              </a:schemeClr>
+            </a:lnRef>
+            <a:fillRef idx="1">
+              <a:schemeClr val="accent1"/>
+            </a:fillRef>
+            <a:effectRef idx="0">
+              <a:schemeClr val="accent1"/>
+            </a:effectRef>
+            <a:fontRef idx="minor">
+              <a:schemeClr val="lt1"/>
+            </a:fontRef>
+          </p:style>
+          <p:txBody>
+            <a:bodyPr rtlCol="0" anchor="ctr"/>
+            <a:lstStyle/>
+            <a:p>
+              <a:pPr algn="ctr"/>
+              <a:endParaRPr lang="de-DE" dirty="0"/>
+            </a:p>
+          </p:txBody>
+        </p:sp>
+        <p:sp>
+          <p:nvSpPr>
+            <p:cNvPr id="21" name="Rechteck 20">
+              <a:extLst>
+                <a:ext uri="{FF2B5EF4-FFF2-40B4-BE49-F238E27FC236}">
+                  <a16:creationId xmlns:a16="http://schemas.microsoft.com/office/drawing/2014/main" id="{7014A5D1-FA75-4383-8BD7-09A7AA9E2AEF}"/>
+                </a:ext>
+              </a:extLst>
+            </p:cNvPr>
+            <p:cNvSpPr/>
+            <p:nvPr/>
+          </p:nvSpPr>
+          <p:spPr>
+            <a:xfrm>
+              <a:off x="2051720" y="3752560"/>
+              <a:ext cx="1286222" cy="248211"/>
+            </a:xfrm>
+            <a:prstGeom prst="rect">
+              <a:avLst/>
+            </a:prstGeom>
+            <a:solidFill>
+              <a:schemeClr val="accent3">
+                <a:lumMod val="40000"/>
+                <a:lumOff val="60000"/>
+              </a:schemeClr>
+            </a:solidFill>
+            <a:ln w="19050">
+              <a:solidFill>
+                <a:srgbClr val="EEFAF7"/>
+              </a:solidFill>
+            </a:ln>
+          </p:spPr>
+          <p:style>
+            <a:lnRef idx="2">
+              <a:schemeClr val="accent1">
+                <a:shade val="50000"/>
+              </a:schemeClr>
+            </a:lnRef>
+            <a:fillRef idx="1">
+              <a:schemeClr val="accent1"/>
+            </a:fillRef>
+            <a:effectRef idx="0">
+              <a:schemeClr val="accent1"/>
+            </a:effectRef>
+            <a:fontRef idx="minor">
+              <a:schemeClr val="lt1"/>
+            </a:fontRef>
+          </p:style>
+          <p:txBody>
+            <a:bodyPr rtlCol="0" anchor="ctr"/>
+            <a:lstStyle/>
+            <a:p>
+              <a:pPr algn="ctr"/>
+              <a:r>
+                <a:rPr lang="de-DE" sz="1200" dirty="0">
+                  <a:solidFill>
+                    <a:srgbClr val="196867"/>
+                  </a:solidFill>
+                </a:rPr>
+                <a:t>Webserver</a:t>
+              </a:r>
+              <a:endParaRPr lang="de-DE" sz="500" dirty="0">
+                <a:solidFill>
+                  <a:srgbClr val="196867"/>
+                </a:solidFill>
+              </a:endParaRPr>
+            </a:p>
+          </p:txBody>
+        </p:sp>
+        <p:sp>
+          <p:nvSpPr>
+            <p:cNvPr id="22" name="Rechteck 21">
+              <a:extLst>
+                <a:ext uri="{FF2B5EF4-FFF2-40B4-BE49-F238E27FC236}">
+                  <a16:creationId xmlns:a16="http://schemas.microsoft.com/office/drawing/2014/main" id="{7BFA93C0-248D-4854-B8A3-E9064B6B3223}"/>
+                </a:ext>
+              </a:extLst>
+            </p:cNvPr>
+            <p:cNvSpPr/>
+            <p:nvPr/>
+          </p:nvSpPr>
+          <p:spPr>
+            <a:xfrm>
+              <a:off x="3481958" y="3752560"/>
+              <a:ext cx="874018" cy="248211"/>
+            </a:xfrm>
+            <a:prstGeom prst="rect">
+              <a:avLst/>
+            </a:prstGeom>
+            <a:solidFill>
+              <a:schemeClr val="accent3">
+                <a:lumMod val="40000"/>
+                <a:lumOff val="60000"/>
+              </a:schemeClr>
+            </a:solidFill>
+            <a:ln w="19050">
+              <a:solidFill>
+                <a:srgbClr val="EEFAF7"/>
+              </a:solidFill>
+            </a:ln>
+          </p:spPr>
+          <p:style>
+            <a:lnRef idx="2">
+              <a:schemeClr val="accent1">
+                <a:shade val="50000"/>
+              </a:schemeClr>
+            </a:lnRef>
+            <a:fillRef idx="1">
+              <a:schemeClr val="accent1"/>
+            </a:fillRef>
+            <a:effectRef idx="0">
+              <a:schemeClr val="accent1"/>
+            </a:effectRef>
+            <a:fontRef idx="minor">
+              <a:schemeClr val="lt1"/>
+            </a:fontRef>
+          </p:style>
+          <p:txBody>
+            <a:bodyPr rtlCol="0" anchor="ctr"/>
+            <a:lstStyle/>
+            <a:p>
+              <a:pPr algn="ctr"/>
+              <a:r>
+                <a:rPr lang="de-DE" sz="1200" dirty="0">
+                  <a:solidFill>
+                    <a:srgbClr val="196867"/>
+                  </a:solidFill>
+                </a:rPr>
+                <a:t>Database</a:t>
+              </a:r>
+              <a:endParaRPr lang="de-DE" sz="500" dirty="0">
+                <a:solidFill>
+                  <a:srgbClr val="196867"/>
+                </a:solidFill>
+              </a:endParaRPr>
+            </a:p>
+          </p:txBody>
+        </p:sp>
+        <p:sp>
+          <p:nvSpPr>
+            <p:cNvPr id="23" name="Rechteck 22">
+              <a:extLst>
+                <a:ext uri="{FF2B5EF4-FFF2-40B4-BE49-F238E27FC236}">
+                  <a16:creationId xmlns:a16="http://schemas.microsoft.com/office/drawing/2014/main" id="{7B540FCB-B203-455D-AA51-737329D4CDA0}"/>
+                </a:ext>
+              </a:extLst>
+            </p:cNvPr>
+            <p:cNvSpPr/>
+            <p:nvPr/>
+          </p:nvSpPr>
+          <p:spPr>
+            <a:xfrm>
+              <a:off x="4496964" y="3752560"/>
+              <a:ext cx="827436" cy="248211"/>
+            </a:xfrm>
+            <a:prstGeom prst="rect">
+              <a:avLst/>
+            </a:prstGeom>
+            <a:solidFill>
+              <a:schemeClr val="accent3">
+                <a:lumMod val="40000"/>
+                <a:lumOff val="60000"/>
+              </a:schemeClr>
+            </a:solidFill>
+            <a:ln w="19050">
+              <a:solidFill>
+                <a:srgbClr val="EEFAF7"/>
+              </a:solidFill>
+            </a:ln>
+          </p:spPr>
+          <p:style>
+            <a:lnRef idx="2">
+              <a:schemeClr val="accent1">
+                <a:shade val="50000"/>
+              </a:schemeClr>
+            </a:lnRef>
+            <a:fillRef idx="1">
+              <a:schemeClr val="accent1"/>
+            </a:fillRef>
+            <a:effectRef idx="0">
+              <a:schemeClr val="accent1"/>
+            </a:effectRef>
+            <a:fontRef idx="minor">
+              <a:schemeClr val="lt1"/>
+            </a:fontRef>
+          </p:style>
+          <p:txBody>
+            <a:bodyPr rtlCol="0" anchor="ctr"/>
+            <a:lstStyle/>
+            <a:p>
+              <a:pPr algn="ctr"/>
+              <a:r>
+                <a:rPr lang="de-DE" sz="1200" dirty="0">
+                  <a:solidFill>
+                    <a:srgbClr val="196867"/>
+                  </a:solidFill>
+                </a:rPr>
+                <a:t>Sockets</a:t>
+              </a:r>
+              <a:endParaRPr lang="de-DE" sz="500" dirty="0">
+                <a:solidFill>
+                  <a:srgbClr val="196867"/>
+                </a:solidFill>
+              </a:endParaRPr>
+            </a:p>
+          </p:txBody>
+        </p:sp>
+        <p:sp>
+          <p:nvSpPr>
+            <p:cNvPr id="24" name="Rechteck 23">
+              <a:extLst>
+                <a:ext uri="{FF2B5EF4-FFF2-40B4-BE49-F238E27FC236}">
+                  <a16:creationId xmlns:a16="http://schemas.microsoft.com/office/drawing/2014/main" id="{7298EE19-7D35-4952-9650-370921AE8CAF}"/>
+                </a:ext>
+              </a:extLst>
+            </p:cNvPr>
+            <p:cNvSpPr/>
+            <p:nvPr/>
+          </p:nvSpPr>
+          <p:spPr>
+            <a:xfrm>
+              <a:off x="5465388" y="3752560"/>
+              <a:ext cx="546772" cy="248211"/>
+            </a:xfrm>
+            <a:prstGeom prst="rect">
+              <a:avLst/>
+            </a:prstGeom>
+            <a:solidFill>
+              <a:schemeClr val="accent3">
+                <a:lumMod val="40000"/>
+                <a:lumOff val="60000"/>
+              </a:schemeClr>
+            </a:solidFill>
+            <a:ln w="19050">
+              <a:solidFill>
+                <a:srgbClr val="EEFAF7"/>
+              </a:solidFill>
+            </a:ln>
+          </p:spPr>
+          <p:style>
+            <a:lnRef idx="2">
+              <a:schemeClr val="accent1">
+                <a:shade val="50000"/>
+              </a:schemeClr>
+            </a:lnRef>
+            <a:fillRef idx="1">
+              <a:schemeClr val="accent1"/>
+            </a:fillRef>
+            <a:effectRef idx="0">
+              <a:schemeClr val="accent1"/>
+            </a:effectRef>
+            <a:fontRef idx="minor">
+              <a:schemeClr val="lt1"/>
+            </a:fontRef>
+          </p:style>
+          <p:txBody>
+            <a:bodyPr rtlCol="0" anchor="ctr"/>
+            <a:lstStyle/>
+            <a:p>
+              <a:pPr algn="ctr"/>
+              <a:r>
+                <a:rPr lang="de-DE" sz="1200" dirty="0">
+                  <a:solidFill>
+                    <a:srgbClr val="196867"/>
+                  </a:solidFill>
+                </a:rPr>
+                <a:t>Files</a:t>
+              </a:r>
+              <a:endParaRPr lang="de-DE" sz="500" dirty="0">
+                <a:solidFill>
+                  <a:srgbClr val="196867"/>
+                </a:solidFill>
+              </a:endParaRPr>
+            </a:p>
+          </p:txBody>
+        </p:sp>
+        <p:sp>
+          <p:nvSpPr>
+            <p:cNvPr id="25" name="Textfeld 24">
+              <a:extLst>
+                <a:ext uri="{FF2B5EF4-FFF2-40B4-BE49-F238E27FC236}">
+                  <a16:creationId xmlns:a16="http://schemas.microsoft.com/office/drawing/2014/main" id="{38BC3CD4-EA9B-4E10-B5D7-95DA012A846F}"/>
+                </a:ext>
+              </a:extLst>
+            </p:cNvPr>
+            <p:cNvSpPr txBox="1"/>
+            <p:nvPr/>
+          </p:nvSpPr>
+          <p:spPr>
+            <a:xfrm>
+              <a:off x="6061749" y="3485311"/>
+              <a:ext cx="468398" cy="584775"/>
+            </a:xfrm>
+            <a:prstGeom prst="rect">
+              <a:avLst/>
+            </a:prstGeom>
+            <a:noFill/>
+          </p:spPr>
+          <p:txBody>
+            <a:bodyPr wrap="none" rtlCol="0">
+              <a:spAutoFit/>
+            </a:bodyPr>
+            <a:lstStyle/>
+            <a:p>
+              <a:r>
+                <a:rPr lang="de-DE" sz="3200" dirty="0">
+                  <a:solidFill>
+                    <a:schemeClr val="bg1"/>
+                  </a:solidFill>
+                </a:rPr>
+                <a:t>…</a:t>
+              </a:r>
+            </a:p>
+          </p:txBody>
+        </p:sp>
+        <p:sp>
+          <p:nvSpPr>
+            <p:cNvPr id="26" name="Textfeld 25">
+              <a:extLst>
+                <a:ext uri="{FF2B5EF4-FFF2-40B4-BE49-F238E27FC236}">
+                  <a16:creationId xmlns:a16="http://schemas.microsoft.com/office/drawing/2014/main" id="{2F9167AF-F16E-423E-9568-5EC7FA04A443}"/>
+                </a:ext>
+              </a:extLst>
+            </p:cNvPr>
+            <p:cNvSpPr txBox="1"/>
+            <p:nvPr/>
+          </p:nvSpPr>
+          <p:spPr>
+            <a:xfrm>
+              <a:off x="1958393" y="4058666"/>
+              <a:ext cx="2323200" cy="276999"/>
+            </a:xfrm>
+            <a:prstGeom prst="rect">
+              <a:avLst/>
+            </a:prstGeom>
+            <a:noFill/>
+          </p:spPr>
+          <p:txBody>
+            <a:bodyPr wrap="none" rtlCol="0">
+              <a:spAutoFit/>
+            </a:bodyPr>
+            <a:lstStyle/>
+            <a:p>
+              <a:r>
+                <a:rPr lang="de-DE" sz="1200" dirty="0">
+                  <a:solidFill>
+                    <a:srgbClr val="196867"/>
+                  </a:solidFill>
+                </a:rPr>
+                <a:t>App Platform System Components</a:t>
+              </a:r>
+            </a:p>
+          </p:txBody>
+        </p:sp>
+        <p:grpSp>
+          <p:nvGrpSpPr>
+            <p:cNvPr id="40" name="Gruppieren 39">
+              <a:extLst>
+                <a:ext uri="{FF2B5EF4-FFF2-40B4-BE49-F238E27FC236}">
+                  <a16:creationId xmlns:a16="http://schemas.microsoft.com/office/drawing/2014/main" id="{57F7E2A2-DA48-47EA-ADA4-64E6C107DF29}"/>
+                </a:ext>
+              </a:extLst>
+            </p:cNvPr>
+            <p:cNvGrpSpPr/>
+            <p:nvPr/>
+          </p:nvGrpSpPr>
+          <p:grpSpPr>
+            <a:xfrm>
+              <a:off x="7938586" y="644892"/>
+              <a:ext cx="260424" cy="260424"/>
+              <a:chOff x="7938586" y="644892"/>
+              <a:chExt cx="260424" cy="260424"/>
+            </a:xfrm>
+          </p:grpSpPr>
+          <p:sp>
+            <p:nvSpPr>
+              <p:cNvPr id="28" name="Ellipse 27">
+                <a:extLst>
+                  <a:ext uri="{FF2B5EF4-FFF2-40B4-BE49-F238E27FC236}">
+                    <a16:creationId xmlns:a16="http://schemas.microsoft.com/office/drawing/2014/main" id="{BE7ACD75-463C-4F14-8735-67AC71CAC426}"/>
+                  </a:ext>
+                </a:extLst>
+              </p:cNvPr>
+              <p:cNvSpPr/>
+              <p:nvPr/>
+            </p:nvSpPr>
+            <p:spPr>
+              <a:xfrm>
+                <a:off x="7938586" y="644892"/>
+                <a:ext cx="260424" cy="260424"/>
+              </a:xfrm>
+              <a:prstGeom prst="ellipse">
+                <a:avLst/>
+              </a:prstGeom>
+              <a:noFill/>
+              <a:ln w="9525"/>
+            </p:spPr>
+            <p:style>
+              <a:lnRef idx="2">
+                <a:schemeClr val="accent1">
+                  <a:shade val="50000"/>
+                </a:schemeClr>
+              </a:lnRef>
+              <a:fillRef idx="1">
+                <a:schemeClr val="accent1"/>
+              </a:fillRef>
+              <a:effectRef idx="0">
+                <a:schemeClr val="accent1"/>
+              </a:effectRef>
+              <a:fontRef idx="minor">
+                <a:schemeClr val="lt1"/>
+              </a:fontRef>
+            </p:style>
+            <p:txBody>
+              <a:bodyPr rtlCol="0" anchor="ctr"/>
+              <a:lstStyle/>
+              <a:p>
+                <a:pPr algn="ctr"/>
+                <a:endParaRPr lang="de-DE"/>
+              </a:p>
+            </p:txBody>
+          </p:sp>
+          <p:sp>
+            <p:nvSpPr>
+              <p:cNvPr id="29" name="Textfeld 28">
+                <a:extLst>
+                  <a:ext uri="{FF2B5EF4-FFF2-40B4-BE49-F238E27FC236}">
+                    <a16:creationId xmlns:a16="http://schemas.microsoft.com/office/drawing/2014/main" id="{44A46EA7-B719-4C0E-9E1F-0CABCD7668BE}"/>
+                  </a:ext>
+                </a:extLst>
+              </p:cNvPr>
+              <p:cNvSpPr txBox="1"/>
+              <p:nvPr/>
+            </p:nvSpPr>
+            <p:spPr>
+              <a:xfrm>
+                <a:off x="7952705" y="656837"/>
+                <a:ext cx="232187" cy="236534"/>
+              </a:xfrm>
+              <a:prstGeom prst="rect">
+                <a:avLst/>
+              </a:prstGeom>
+              <a:noFill/>
+            </p:spPr>
+            <p:txBody>
+              <a:bodyPr wrap="none" rtlCol="0">
+                <a:spAutoFit/>
+              </a:bodyPr>
+              <a:lstStyle/>
+              <a:p>
+                <a:r>
+                  <a:rPr lang="de-DE" sz="1100" dirty="0"/>
+                  <a:t>1</a:t>
+                </a:r>
+              </a:p>
+            </p:txBody>
+          </p:sp>
+        </p:grpSp>
+        <p:grpSp>
+          <p:nvGrpSpPr>
+            <p:cNvPr id="43" name="Gruppieren 42">
+              <a:extLst>
+                <a:ext uri="{FF2B5EF4-FFF2-40B4-BE49-F238E27FC236}">
+                  <a16:creationId xmlns:a16="http://schemas.microsoft.com/office/drawing/2014/main" id="{65A38549-BBB0-467E-8036-694CE0B22EBF}"/>
+                </a:ext>
+              </a:extLst>
+            </p:cNvPr>
+            <p:cNvGrpSpPr/>
+            <p:nvPr/>
+          </p:nvGrpSpPr>
+          <p:grpSpPr>
+            <a:xfrm>
+              <a:off x="5059790" y="1643596"/>
+              <a:ext cx="260424" cy="261610"/>
+              <a:chOff x="5059790" y="1643596"/>
+              <a:chExt cx="260424" cy="261610"/>
+            </a:xfrm>
+          </p:grpSpPr>
+          <p:sp>
+            <p:nvSpPr>
+              <p:cNvPr id="31" name="Ellipse 30">
+                <a:extLst>
+                  <a:ext uri="{FF2B5EF4-FFF2-40B4-BE49-F238E27FC236}">
+                    <a16:creationId xmlns:a16="http://schemas.microsoft.com/office/drawing/2014/main" id="{E883B724-F8F2-4258-A710-A9F1B7CB8462}"/>
+                  </a:ext>
+                </a:extLst>
+              </p:cNvPr>
+              <p:cNvSpPr/>
+              <p:nvPr/>
+            </p:nvSpPr>
+            <p:spPr>
+              <a:xfrm>
+                <a:off x="5059790" y="1644189"/>
+                <a:ext cx="260424" cy="260424"/>
+              </a:xfrm>
+              <a:prstGeom prst="ellipse">
+                <a:avLst/>
+              </a:prstGeom>
+              <a:noFill/>
+              <a:ln w="9525"/>
+            </p:spPr>
+            <p:style>
+              <a:lnRef idx="2">
+                <a:schemeClr val="accent1">
+                  <a:shade val="50000"/>
+                </a:schemeClr>
+              </a:lnRef>
+              <a:fillRef idx="1">
+                <a:schemeClr val="accent1"/>
+              </a:fillRef>
+              <a:effectRef idx="0">
+                <a:schemeClr val="accent1"/>
+              </a:effectRef>
+              <a:fontRef idx="minor">
+                <a:schemeClr val="lt1"/>
+              </a:fontRef>
+            </p:style>
+            <p:txBody>
+              <a:bodyPr rtlCol="0" anchor="ctr"/>
+              <a:lstStyle/>
+              <a:p>
+                <a:pPr algn="ctr"/>
+                <a:endParaRPr lang="de-DE"/>
+              </a:p>
+            </p:txBody>
+          </p:sp>
+          <p:sp>
+            <p:nvSpPr>
+              <p:cNvPr id="32" name="Textfeld 31">
+                <a:extLst>
+                  <a:ext uri="{FF2B5EF4-FFF2-40B4-BE49-F238E27FC236}">
+                    <a16:creationId xmlns:a16="http://schemas.microsoft.com/office/drawing/2014/main" id="{0AFC58BC-52E8-4E5E-9D2F-BFD136C39F46}"/>
+                  </a:ext>
+                </a:extLst>
+              </p:cNvPr>
+              <p:cNvSpPr txBox="1"/>
+              <p:nvPr/>
+            </p:nvSpPr>
+            <p:spPr>
+              <a:xfrm>
+                <a:off x="5061601" y="1643596"/>
+                <a:ext cx="256802" cy="261610"/>
+              </a:xfrm>
+              <a:prstGeom prst="rect">
+                <a:avLst/>
+              </a:prstGeom>
+              <a:noFill/>
+            </p:spPr>
+            <p:txBody>
+              <a:bodyPr wrap="none" rtlCol="0">
+                <a:spAutoFit/>
+              </a:bodyPr>
+              <a:lstStyle/>
+              <a:p>
+                <a:r>
+                  <a:rPr lang="de-DE" sz="1100" dirty="0"/>
+                  <a:t>2</a:t>
+                </a:r>
+              </a:p>
+            </p:txBody>
+          </p:sp>
+        </p:grpSp>
+        <p:grpSp>
+          <p:nvGrpSpPr>
+            <p:cNvPr id="41" name="Gruppieren 40">
+              <a:extLst>
+                <a:ext uri="{FF2B5EF4-FFF2-40B4-BE49-F238E27FC236}">
+                  <a16:creationId xmlns:a16="http://schemas.microsoft.com/office/drawing/2014/main" id="{14031840-FEF6-4516-A59E-B27B3151955F}"/>
+                </a:ext>
+              </a:extLst>
+            </p:cNvPr>
+            <p:cNvGrpSpPr/>
+            <p:nvPr/>
+          </p:nvGrpSpPr>
+          <p:grpSpPr>
+            <a:xfrm>
+              <a:off x="7938586" y="1643596"/>
+              <a:ext cx="260424" cy="261610"/>
+              <a:chOff x="7938586" y="1643596"/>
+              <a:chExt cx="260424" cy="261610"/>
+            </a:xfrm>
+          </p:grpSpPr>
+          <p:sp>
+            <p:nvSpPr>
+              <p:cNvPr id="34" name="Ellipse 33">
+                <a:extLst>
+                  <a:ext uri="{FF2B5EF4-FFF2-40B4-BE49-F238E27FC236}">
+                    <a16:creationId xmlns:a16="http://schemas.microsoft.com/office/drawing/2014/main" id="{6A5BD67E-5A84-46F3-B663-AEFA559C7596}"/>
+                  </a:ext>
+                </a:extLst>
+              </p:cNvPr>
+              <p:cNvSpPr/>
+              <p:nvPr/>
+            </p:nvSpPr>
+            <p:spPr>
+              <a:xfrm>
+                <a:off x="7938586" y="1644189"/>
+                <a:ext cx="260424" cy="260424"/>
+              </a:xfrm>
+              <a:prstGeom prst="ellipse">
+                <a:avLst/>
+              </a:prstGeom>
+              <a:noFill/>
+              <a:ln w="9525"/>
+            </p:spPr>
+            <p:style>
+              <a:lnRef idx="2">
+                <a:schemeClr val="accent1">
+                  <a:shade val="50000"/>
+                </a:schemeClr>
+              </a:lnRef>
+              <a:fillRef idx="1">
+                <a:schemeClr val="accent1"/>
+              </a:fillRef>
+              <a:effectRef idx="0">
+                <a:schemeClr val="accent1"/>
+              </a:effectRef>
+              <a:fontRef idx="minor">
+                <a:schemeClr val="lt1"/>
+              </a:fontRef>
+            </p:style>
+            <p:txBody>
+              <a:bodyPr rtlCol="0" anchor="ctr"/>
+              <a:lstStyle/>
+              <a:p>
+                <a:pPr algn="ctr"/>
+                <a:endParaRPr lang="de-DE"/>
+              </a:p>
+            </p:txBody>
+          </p:sp>
+          <p:sp>
+            <p:nvSpPr>
+              <p:cNvPr id="35" name="Textfeld 34">
+                <a:extLst>
+                  <a:ext uri="{FF2B5EF4-FFF2-40B4-BE49-F238E27FC236}">
+                    <a16:creationId xmlns:a16="http://schemas.microsoft.com/office/drawing/2014/main" id="{65E5EFB0-B7C8-4BAF-9DEF-34277D51B2D2}"/>
+                  </a:ext>
+                </a:extLst>
+              </p:cNvPr>
+              <p:cNvSpPr txBox="1"/>
+              <p:nvPr/>
+            </p:nvSpPr>
+            <p:spPr>
+              <a:xfrm>
+                <a:off x="7940397" y="1643596"/>
+                <a:ext cx="256802" cy="261610"/>
+              </a:xfrm>
+              <a:prstGeom prst="rect">
+                <a:avLst/>
+              </a:prstGeom>
+              <a:noFill/>
+            </p:spPr>
+            <p:txBody>
+              <a:bodyPr wrap="none" rtlCol="0">
+                <a:spAutoFit/>
+              </a:bodyPr>
+              <a:lstStyle/>
+              <a:p>
+                <a:r>
+                  <a:rPr lang="de-DE" sz="1100" dirty="0"/>
+                  <a:t>3</a:t>
+                </a:r>
+              </a:p>
+            </p:txBody>
+          </p:sp>
+        </p:grpSp>
+        <p:grpSp>
+          <p:nvGrpSpPr>
+            <p:cNvPr id="42" name="Gruppieren 41">
+              <a:extLst>
+                <a:ext uri="{FF2B5EF4-FFF2-40B4-BE49-F238E27FC236}">
+                  <a16:creationId xmlns:a16="http://schemas.microsoft.com/office/drawing/2014/main" id="{A4FF8366-850F-4435-8062-AFD2C3DED386}"/>
+                </a:ext>
+              </a:extLst>
+            </p:cNvPr>
+            <p:cNvGrpSpPr/>
+            <p:nvPr/>
+          </p:nvGrpSpPr>
+          <p:grpSpPr>
+            <a:xfrm>
+              <a:off x="7938586" y="2648273"/>
+              <a:ext cx="260424" cy="261610"/>
+              <a:chOff x="7938586" y="2648273"/>
+              <a:chExt cx="260424" cy="261610"/>
+            </a:xfrm>
+          </p:grpSpPr>
+          <p:sp>
+            <p:nvSpPr>
+              <p:cNvPr id="37" name="Ellipse 36">
+                <a:extLst>
+                  <a:ext uri="{FF2B5EF4-FFF2-40B4-BE49-F238E27FC236}">
+                    <a16:creationId xmlns:a16="http://schemas.microsoft.com/office/drawing/2014/main" id="{BEAF79E4-14E8-49F6-B69F-F60C8D60D047}"/>
+                  </a:ext>
+                </a:extLst>
+              </p:cNvPr>
+              <p:cNvSpPr/>
+              <p:nvPr/>
+            </p:nvSpPr>
+            <p:spPr>
+              <a:xfrm>
+                <a:off x="7938586" y="2648866"/>
+                <a:ext cx="260424" cy="260424"/>
+              </a:xfrm>
+              <a:prstGeom prst="ellipse">
+                <a:avLst/>
+              </a:prstGeom>
+              <a:noFill/>
+              <a:ln w="9525"/>
+            </p:spPr>
+            <p:style>
+              <a:lnRef idx="2">
+                <a:schemeClr val="accent1">
+                  <a:shade val="50000"/>
+                </a:schemeClr>
+              </a:lnRef>
+              <a:fillRef idx="1">
+                <a:schemeClr val="accent1"/>
+              </a:fillRef>
+              <a:effectRef idx="0">
+                <a:schemeClr val="accent1"/>
+              </a:effectRef>
+              <a:fontRef idx="minor">
+                <a:schemeClr val="lt1"/>
+              </a:fontRef>
+            </p:style>
+            <p:txBody>
+              <a:bodyPr rtlCol="0" anchor="ctr"/>
+              <a:lstStyle/>
+              <a:p>
+                <a:pPr algn="ctr"/>
+                <a:endParaRPr lang="de-DE"/>
+              </a:p>
+            </p:txBody>
+          </p:sp>
+          <p:sp>
+            <p:nvSpPr>
+              <p:cNvPr id="38" name="Textfeld 37">
+                <a:extLst>
+                  <a:ext uri="{FF2B5EF4-FFF2-40B4-BE49-F238E27FC236}">
+                    <a16:creationId xmlns:a16="http://schemas.microsoft.com/office/drawing/2014/main" id="{EB35D22C-941B-4982-94E2-351651EA3CE5}"/>
+                  </a:ext>
+                </a:extLst>
+              </p:cNvPr>
+              <p:cNvSpPr txBox="1"/>
+              <p:nvPr/>
+            </p:nvSpPr>
+            <p:spPr>
+              <a:xfrm>
+                <a:off x="7940397" y="2648273"/>
+                <a:ext cx="256802" cy="261610"/>
+              </a:xfrm>
+              <a:prstGeom prst="rect">
+                <a:avLst/>
+              </a:prstGeom>
+              <a:noFill/>
+            </p:spPr>
+            <p:txBody>
+              <a:bodyPr wrap="none" rtlCol="0">
+                <a:spAutoFit/>
+              </a:bodyPr>
+              <a:lstStyle/>
+              <a:p>
+                <a:r>
+                  <a:rPr lang="de-DE" sz="1100" dirty="0"/>
+                  <a:t>4</a:t>
+                </a:r>
+              </a:p>
+            </p:txBody>
+          </p:sp>
+        </p:grpSp>
+        <p:cxnSp>
+          <p:nvCxnSpPr>
+            <p:cNvPr id="48" name="Gerade Verbindung mit Pfeil 47">
+              <a:extLst>
+                <a:ext uri="{FF2B5EF4-FFF2-40B4-BE49-F238E27FC236}">
+                  <a16:creationId xmlns:a16="http://schemas.microsoft.com/office/drawing/2014/main" id="{AF7FCDA8-7AA9-4C61-8F7E-2F6A52CDF2C6}"/>
+                </a:ext>
+              </a:extLst>
+            </p:cNvPr>
+            <p:cNvCxnSpPr/>
+            <p:nvPr/>
+          </p:nvCxnSpPr>
+          <p:spPr>
+            <a:xfrm>
+              <a:off x="7011814" y="1253537"/>
+              <a:ext cx="0" cy="438785"/>
+            </a:xfrm>
+            <a:prstGeom prst="straightConnector1">
+              <a:avLst/>
+            </a:prstGeom>
+            <a:ln w="19050">
+              <a:tailEnd type="triangle"/>
+            </a:ln>
+          </p:spPr>
+          <p:style>
+            <a:lnRef idx="1">
+              <a:schemeClr val="accent1"/>
+            </a:lnRef>
+            <a:fillRef idx="0">
+              <a:schemeClr val="accent1"/>
+            </a:fillRef>
+            <a:effectRef idx="0">
+              <a:schemeClr val="accent1"/>
+            </a:effectRef>
+            <a:fontRef idx="minor">
+              <a:schemeClr val="tx1"/>
+            </a:fontRef>
+          </p:style>
+        </p:cxnSp>
+        <p:cxnSp>
+          <p:nvCxnSpPr>
+            <p:cNvPr id="49" name="Gerade Verbindung mit Pfeil 48">
+              <a:extLst>
+                <a:ext uri="{FF2B5EF4-FFF2-40B4-BE49-F238E27FC236}">
+                  <a16:creationId xmlns:a16="http://schemas.microsoft.com/office/drawing/2014/main" id="{DADB15C4-F858-4814-9FC0-5BED3EEC1CAC}"/>
+                </a:ext>
+              </a:extLst>
+            </p:cNvPr>
+            <p:cNvCxnSpPr>
+              <a:cxnSpLocks/>
+            </p:cNvCxnSpPr>
+            <p:nvPr/>
+          </p:nvCxnSpPr>
+          <p:spPr>
+            <a:xfrm>
+              <a:off x="5537856" y="1364972"/>
+              <a:ext cx="0" cy="1391876"/>
+            </a:xfrm>
+            <a:prstGeom prst="straightConnector1">
+              <a:avLst/>
+            </a:prstGeom>
+            <a:ln w="19050">
+              <a:tailEnd type="triangle"/>
+            </a:ln>
+          </p:spPr>
+          <p:style>
+            <a:lnRef idx="1">
+              <a:schemeClr val="accent1"/>
+            </a:lnRef>
+            <a:fillRef idx="0">
+              <a:schemeClr val="accent1"/>
+            </a:fillRef>
+            <a:effectRef idx="0">
+              <a:schemeClr val="accent1"/>
+            </a:effectRef>
+            <a:fontRef idx="minor">
+              <a:schemeClr val="tx1"/>
+            </a:fontRef>
+          </p:style>
+        </p:cxnSp>
+        <p:cxnSp>
+          <p:nvCxnSpPr>
+            <p:cNvPr id="52" name="Gerade Verbindung mit Pfeil 51">
+              <a:extLst>
+                <a:ext uri="{FF2B5EF4-FFF2-40B4-BE49-F238E27FC236}">
+                  <a16:creationId xmlns:a16="http://schemas.microsoft.com/office/drawing/2014/main" id="{0EB17DF7-9187-476B-97F4-D737FB1024C7}"/>
+                </a:ext>
+              </a:extLst>
+            </p:cNvPr>
+            <p:cNvCxnSpPr/>
+            <p:nvPr/>
+          </p:nvCxnSpPr>
+          <p:spPr>
+            <a:xfrm>
+              <a:off x="4548393" y="3225638"/>
+              <a:ext cx="0" cy="438785"/>
+            </a:xfrm>
+            <a:prstGeom prst="straightConnector1">
+              <a:avLst/>
+            </a:prstGeom>
+            <a:ln w="19050">
+              <a:tailEnd type="triangle"/>
+            </a:ln>
+          </p:spPr>
+          <p:style>
+            <a:lnRef idx="1">
+              <a:schemeClr val="accent1"/>
+            </a:lnRef>
+            <a:fillRef idx="0">
+              <a:schemeClr val="accent1"/>
+            </a:fillRef>
+            <a:effectRef idx="0">
+              <a:schemeClr val="accent1"/>
+            </a:effectRef>
+            <a:fontRef idx="minor">
+              <a:schemeClr val="tx1"/>
+            </a:fontRef>
+          </p:style>
+        </p:cxnSp>
+        <p:cxnSp>
+          <p:nvCxnSpPr>
+            <p:cNvPr id="53" name="Gerade Verbindung mit Pfeil 52">
+              <a:extLst>
+                <a:ext uri="{FF2B5EF4-FFF2-40B4-BE49-F238E27FC236}">
+                  <a16:creationId xmlns:a16="http://schemas.microsoft.com/office/drawing/2014/main" id="{07ABCCC4-6B4E-4E0F-A453-38CC3287678D}"/>
+                </a:ext>
+              </a:extLst>
+            </p:cNvPr>
+            <p:cNvCxnSpPr/>
+            <p:nvPr/>
+          </p:nvCxnSpPr>
+          <p:spPr>
+            <a:xfrm>
+              <a:off x="2746889" y="1253537"/>
+              <a:ext cx="0" cy="438785"/>
+            </a:xfrm>
+            <a:prstGeom prst="straightConnector1">
+              <a:avLst/>
+            </a:prstGeom>
+            <a:ln w="19050">
+              <a:tailEnd type="triangle"/>
+            </a:ln>
+          </p:spPr>
+          <p:style>
+            <a:lnRef idx="1">
+              <a:schemeClr val="accent1"/>
+            </a:lnRef>
+            <a:fillRef idx="0">
+              <a:schemeClr val="accent1"/>
+            </a:fillRef>
+            <a:effectRef idx="0">
+              <a:schemeClr val="accent1"/>
+            </a:effectRef>
+            <a:fontRef idx="minor">
+              <a:schemeClr val="tx1"/>
+            </a:fontRef>
+          </p:style>
+        </p:cxnSp>
+        <p:cxnSp>
+          <p:nvCxnSpPr>
+            <p:cNvPr id="54" name="Gerade Verbindung mit Pfeil 53">
+              <a:extLst>
+                <a:ext uri="{FF2B5EF4-FFF2-40B4-BE49-F238E27FC236}">
+                  <a16:creationId xmlns:a16="http://schemas.microsoft.com/office/drawing/2014/main" id="{73FF8766-A0F4-499E-8624-BB635C44A9A2}"/>
+                </a:ext>
+              </a:extLst>
+            </p:cNvPr>
+            <p:cNvCxnSpPr/>
+            <p:nvPr/>
+          </p:nvCxnSpPr>
+          <p:spPr>
+            <a:xfrm>
+              <a:off x="2746889" y="2318062"/>
+              <a:ext cx="0" cy="438785"/>
+            </a:xfrm>
+            <a:prstGeom prst="straightConnector1">
+              <a:avLst/>
+            </a:prstGeom>
+            <a:ln w="19050">
+              <a:tailEnd type="triangle"/>
+            </a:ln>
+          </p:spPr>
+          <p:style>
+            <a:lnRef idx="1">
+              <a:schemeClr val="accent1"/>
+            </a:lnRef>
+            <a:fillRef idx="0">
+              <a:schemeClr val="accent1"/>
+            </a:fillRef>
+            <a:effectRef idx="0">
+              <a:schemeClr val="accent1"/>
+            </a:effectRef>
+            <a:fontRef idx="minor">
+              <a:schemeClr val="tx1"/>
+            </a:fontRef>
+          </p:style>
+        </p:cxnSp>
+        <p:sp>
+          <p:nvSpPr>
+            <p:cNvPr id="56" name="Geschweifte Klammer links 55">
+              <a:extLst>
+                <a:ext uri="{FF2B5EF4-FFF2-40B4-BE49-F238E27FC236}">
+                  <a16:creationId xmlns:a16="http://schemas.microsoft.com/office/drawing/2014/main" id="{0AEAE1A2-5291-47ED-9956-E6FD2DD4E7FF}"/>
+                </a:ext>
+              </a:extLst>
+            </p:cNvPr>
+            <p:cNvSpPr/>
+            <p:nvPr/>
+          </p:nvSpPr>
+          <p:spPr>
+            <a:xfrm>
+              <a:off x="1596788" y="749939"/>
+              <a:ext cx="166900" cy="2539171"/>
+            </a:xfrm>
+            <a:prstGeom prst="leftBrace">
+              <a:avLst/>
+            </a:prstGeom>
+            <a:ln w="12700"/>
+          </p:spPr>
+          <p:style>
+            <a:lnRef idx="1">
+              <a:schemeClr val="accent1"/>
+            </a:lnRef>
+            <a:fillRef idx="0">
+              <a:schemeClr val="accent1"/>
+            </a:fillRef>
+            <a:effectRef idx="0">
+              <a:schemeClr val="accent1"/>
+            </a:effectRef>
+            <a:fontRef idx="minor">
+              <a:schemeClr val="tx1"/>
+            </a:fontRef>
+          </p:style>
+          <p:txBody>
+            <a:bodyPr rtlCol="0" anchor="ctr"/>
+            <a:lstStyle/>
+            <a:p>
+              <a:pPr algn="ctr"/>
+              <a:endParaRPr lang="de-DE" b="1" dirty="0"/>
+            </a:p>
+          </p:txBody>
+        </p:sp>
+        <p:sp>
+          <p:nvSpPr>
+            <p:cNvPr id="57" name="Textfeld 56">
+              <a:extLst>
+                <a:ext uri="{FF2B5EF4-FFF2-40B4-BE49-F238E27FC236}">
+                  <a16:creationId xmlns:a16="http://schemas.microsoft.com/office/drawing/2014/main" id="{299FFA1C-6A29-4A41-B950-8F8E26E67091}"/>
+                </a:ext>
+              </a:extLst>
+            </p:cNvPr>
+            <p:cNvSpPr txBox="1"/>
+            <p:nvPr/>
+          </p:nvSpPr>
+          <p:spPr>
+            <a:xfrm>
+              <a:off x="305415" y="1796625"/>
+              <a:ext cx="1280863" cy="646331"/>
+            </a:xfrm>
+            <a:prstGeom prst="rect">
+              <a:avLst/>
+            </a:prstGeom>
+            <a:noFill/>
+          </p:spPr>
+          <p:txBody>
+            <a:bodyPr wrap="none" rtlCol="0">
+              <a:spAutoFit/>
+            </a:bodyPr>
+            <a:lstStyle/>
+            <a:p>
+              <a:pPr algn="r"/>
+              <a:r>
+                <a:rPr lang="de-DE" sz="1200" dirty="0"/>
+                <a:t>App-</a:t>
+              </a:r>
+              <a:br>
+                <a:rPr lang="de-DE" sz="1200" dirty="0"/>
+              </a:br>
+              <a:r>
+                <a:rPr lang="de-DE" sz="1200" dirty="0"/>
+                <a:t>Binary</a:t>
+              </a:r>
+              <a:br>
+                <a:rPr lang="de-DE" sz="1200" dirty="0"/>
+              </a:br>
+              <a:r>
+                <a:rPr lang="de-DE" sz="1200" dirty="0"/>
+                <a:t>(SDK + own code)</a:t>
+              </a:r>
+            </a:p>
+          </p:txBody>
+        </p:sp>
+        <p:sp>
+          <p:nvSpPr>
+            <p:cNvPr id="58" name="Textfeld 57">
+              <a:extLst>
+                <a:ext uri="{FF2B5EF4-FFF2-40B4-BE49-F238E27FC236}">
+                  <a16:creationId xmlns:a16="http://schemas.microsoft.com/office/drawing/2014/main" id="{463A3DA5-4D0B-4579-804D-A4519C297776}"/>
+                </a:ext>
+              </a:extLst>
+            </p:cNvPr>
+            <p:cNvSpPr txBox="1"/>
+            <p:nvPr/>
+          </p:nvSpPr>
+          <p:spPr>
+            <a:xfrm>
+              <a:off x="892107" y="3800847"/>
+              <a:ext cx="725070" cy="461665"/>
+            </a:xfrm>
+            <a:prstGeom prst="rect">
+              <a:avLst/>
+            </a:prstGeom>
+            <a:noFill/>
+          </p:spPr>
+          <p:txBody>
+            <a:bodyPr wrap="none" rtlCol="0">
+              <a:spAutoFit/>
+            </a:bodyPr>
+            <a:lstStyle/>
+            <a:p>
+              <a:r>
+                <a:rPr lang="de-DE" sz="1200" dirty="0"/>
+                <a:t>App</a:t>
+              </a:r>
+              <a:br>
+                <a:rPr lang="de-DE" sz="1200" dirty="0"/>
+              </a:br>
+              <a:r>
+                <a:rPr lang="de-DE" sz="1200" dirty="0"/>
+                <a:t>Platform</a:t>
+              </a:r>
+            </a:p>
+          </p:txBody>
+        </p:sp>
+        <p:sp>
+          <p:nvSpPr>
+            <p:cNvPr id="59" name="Geschweifte Klammer links 58">
+              <a:extLst>
+                <a:ext uri="{FF2B5EF4-FFF2-40B4-BE49-F238E27FC236}">
+                  <a16:creationId xmlns:a16="http://schemas.microsoft.com/office/drawing/2014/main" id="{AAAE32FD-780B-4E23-9EBC-713118ED8664}"/>
+                </a:ext>
+              </a:extLst>
+            </p:cNvPr>
+            <p:cNvSpPr/>
+            <p:nvPr/>
+          </p:nvSpPr>
+          <p:spPr>
+            <a:xfrm>
+              <a:off x="1596788" y="3483523"/>
+              <a:ext cx="166900" cy="1032443"/>
+            </a:xfrm>
+            <a:prstGeom prst="leftBrace">
+              <a:avLst/>
+            </a:prstGeom>
+            <a:ln w="12700"/>
+          </p:spPr>
+          <p:style>
+            <a:lnRef idx="1">
+              <a:schemeClr val="accent1"/>
+            </a:lnRef>
+            <a:fillRef idx="0">
+              <a:schemeClr val="accent1"/>
+            </a:fillRef>
+            <a:effectRef idx="0">
+              <a:schemeClr val="accent1"/>
+            </a:effectRef>
+            <a:fontRef idx="minor">
+              <a:schemeClr val="tx1"/>
+            </a:fontRef>
+          </p:style>
+          <p:txBody>
+            <a:bodyPr rtlCol="0" anchor="ctr"/>
+            <a:lstStyle/>
+            <a:p>
+              <a:pPr algn="ctr"/>
+              <a:endParaRPr lang="de-DE" b="1" dirty="0"/>
+            </a:p>
+          </p:txBody>
+        </p:sp>
+      </p:grpSp>
+    </p:spTree>
+    <p:extLst>
+      <p:ext uri="{BB962C8B-B14F-4D97-AF65-F5344CB8AC3E}">
+        <p14:creationId xmlns:p14="http://schemas.microsoft.com/office/powerpoint/2010/main" val="2681211369"/>
+      </p:ext>
+    </p:extLst>
+  </p:cSld>
+  <p:clrMapOvr>
+    <a:masterClrMapping/>
+  </p:clrMapOvr>
+</p:sld>
+</file>
+
 <file path=ppt/theme/theme1.xml><?xml version="1.0" encoding="utf-8"?>
 <a:theme xmlns:a="http://schemas.openxmlformats.org/drawingml/2006/main" name="1_Präsentation_Vorlage_2015_v2">
   <a:themeElements>

</xml_diff>